<commit_message>
new visualizaiton for plot
</commit_message>
<xml_diff>
--- a/presentation/2020_presentation_patronage_brazil_lab.pptx
+++ b/presentation/2020_presentation_patronage_brazil_lab.pptx
@@ -5,7 +5,7 @@
     <p:sldMasterId id="2147483660" r:id="rId1"/>
   </p:sldMasterIdLst>
   <p:notesMasterIdLst>
-    <p:notesMasterId r:id="rId15"/>
+    <p:notesMasterId r:id="rId16"/>
   </p:notesMasterIdLst>
   <p:sldIdLst>
     <p:sldId id="256" r:id="rId2"/>
@@ -17,10 +17,11 @@
     <p:sldId id="262" r:id="rId8"/>
     <p:sldId id="263" r:id="rId9"/>
     <p:sldId id="264" r:id="rId10"/>
-    <p:sldId id="269" r:id="rId11"/>
-    <p:sldId id="267" r:id="rId12"/>
-    <p:sldId id="266" r:id="rId13"/>
-    <p:sldId id="268" r:id="rId14"/>
+    <p:sldId id="267" r:id="rId11"/>
+    <p:sldId id="266" r:id="rId12"/>
+    <p:sldId id="268" r:id="rId13"/>
+    <p:sldId id="269" r:id="rId14"/>
+    <p:sldId id="270" r:id="rId15"/>
   </p:sldIdLst>
   <p:sldSz cx="9144000" cy="5143500" type="screen16x9"/>
   <p:notesSz cx="6858000" cy="9144000"/>
@@ -2394,8 +2395,8 @@
         </p:nvSpPr>
         <p:spPr>
           <a:xfrm>
-            <a:off x="311700" y="1152475"/>
-            <a:ext cx="8520600" cy="3416400"/>
+            <a:off x="311700" y="1573187"/>
+            <a:ext cx="8520600" cy="1997125"/>
           </a:xfrm>
           <a:prstGeom prst="rect">
             <a:avLst/>
@@ -2664,7 +2665,12 @@
             <p:ph idx="1"/>
           </p:nvPr>
         </p:nvSpPr>
-        <p:spPr/>
+        <p:spPr>
+          <a:xfrm>
+            <a:off x="628650" y="1541263"/>
+            <a:ext cx="7886700" cy="2060973"/>
+          </a:xfrm>
+        </p:spPr>
         <p:txBody>
           <a:bodyPr/>
           <a:lstStyle/>
@@ -4763,8 +4769,8 @@
         </p:nvSpPr>
         <p:spPr>
           <a:xfrm>
-            <a:off x="628650" y="1369219"/>
-            <a:ext cx="7886700" cy="3263504"/>
+            <a:off x="628650" y="1541263"/>
+            <a:ext cx="7886700" cy="2060973"/>
           </a:xfrm>
           <a:prstGeom prst="rect">
             <a:avLst/>
@@ -5651,7 +5657,7 @@
           <p:cNvPr id="2" name="Title 1">
             <a:extLst>
               <a:ext uri="{FF2B5EF4-FFF2-40B4-BE49-F238E27FC236}">
-                <a16:creationId xmlns:a16="http://schemas.microsoft.com/office/drawing/2014/main" id="{0C9D593B-5443-3046-AC1C-7C6B89786860}"/>
+                <a16:creationId xmlns:a16="http://schemas.microsoft.com/office/drawing/2014/main" id="{462A6E35-6144-9448-9B06-36C0107851D4}"/>
               </a:ext>
             </a:extLst>
           </p:cNvPr>
@@ -5662,44 +5668,57 @@
             <p:ph type="title"/>
           </p:nvPr>
         </p:nvSpPr>
-        <p:spPr/>
+        <p:spPr>
+          <a:xfrm>
+            <a:off x="808264" y="2150286"/>
+            <a:ext cx="3037115" cy="712299"/>
+          </a:xfrm>
+        </p:spPr>
         <p:txBody>
           <a:bodyPr/>
           <a:lstStyle/>
           <a:p>
-            <a:endParaRPr lang="en-US"/>
-          </a:p>
-        </p:txBody>
-      </p:sp>
-      <p:sp>
-        <p:nvSpPr>
-          <p:cNvPr id="3" name="Text Placeholder 2">
+            <a:r>
+              <a:rPr lang="en-US" sz="2400" dirty="0"/>
+              <a:t>Uneven quality of education</a:t>
+            </a:r>
+          </a:p>
+        </p:txBody>
+      </p:sp>
+      <p:pic>
+        <p:nvPicPr>
+          <p:cNvPr id="5" name="Picture 4">
             <a:extLst>
               <a:ext uri="{FF2B5EF4-FFF2-40B4-BE49-F238E27FC236}">
-                <a16:creationId xmlns:a16="http://schemas.microsoft.com/office/drawing/2014/main" id="{F3697F90-1E3C-F348-9937-C347C55A9C53}"/>
+                <a16:creationId xmlns:a16="http://schemas.microsoft.com/office/drawing/2014/main" id="{A125E0D4-CFA3-5842-A2EA-9D4920649CBF}"/>
               </a:ext>
             </a:extLst>
           </p:cNvPr>
-          <p:cNvSpPr>
-            <a:spLocks noGrp="1"/>
-          </p:cNvSpPr>
-          <p:nvPr>
-            <p:ph type="body" idx="1"/>
-          </p:nvPr>
-        </p:nvSpPr>
-        <p:spPr/>
-        <p:txBody>
-          <a:bodyPr/>
-          <a:lstStyle/>
-          <a:p>
-            <a:endParaRPr lang="en-US" dirty="0"/>
-          </a:p>
-        </p:txBody>
-      </p:sp>
+          <p:cNvPicPr>
+            <a:picLocks noChangeAspect="1"/>
+          </p:cNvPicPr>
+          <p:nvPr/>
+        </p:nvPicPr>
+        <p:blipFill>
+          <a:blip r:embed="rId2"/>
+          <a:stretch>
+            <a:fillRect/>
+          </a:stretch>
+        </p:blipFill>
+        <p:spPr>
+          <a:xfrm>
+            <a:off x="4572000" y="387874"/>
+            <a:ext cx="4572000" cy="4572000"/>
+          </a:xfrm>
+          <a:prstGeom prst="rect">
+            <a:avLst/>
+          </a:prstGeom>
+        </p:spPr>
+      </p:pic>
     </p:spTree>
     <p:extLst>
       <p:ext uri="{BB962C8B-B14F-4D97-AF65-F5344CB8AC3E}">
-        <p14:creationId xmlns:p14="http://schemas.microsoft.com/office/powerpoint/2010/main" val="2657568710"/>
+        <p14:creationId xmlns:p14="http://schemas.microsoft.com/office/powerpoint/2010/main" val="4229263783"/>
       </p:ext>
     </p:extLst>
   </p:cSld>
@@ -5731,7 +5750,7 @@
           <p:cNvPr id="2" name="Title 1">
             <a:extLst>
               <a:ext uri="{FF2B5EF4-FFF2-40B4-BE49-F238E27FC236}">
-                <a16:creationId xmlns:a16="http://schemas.microsoft.com/office/drawing/2014/main" id="{462A6E35-6144-9448-9B06-36C0107851D4}"/>
+                <a16:creationId xmlns:a16="http://schemas.microsoft.com/office/drawing/2014/main" id="{1EA46D49-AC36-5146-872C-916A16E7B676}"/>
               </a:ext>
             </a:extLst>
           </p:cNvPr>
@@ -5742,57 +5761,128 @@
             <p:ph type="title"/>
           </p:nvPr>
         </p:nvSpPr>
-        <p:spPr>
-          <a:xfrm>
-            <a:off x="726621" y="2215600"/>
-            <a:ext cx="3845379" cy="712299"/>
-          </a:xfrm>
-        </p:spPr>
+        <p:spPr/>
         <p:txBody>
           <a:bodyPr/>
           <a:lstStyle/>
           <a:p>
             <a:r>
-              <a:rPr lang="en-US" sz="2400" dirty="0"/>
-              <a:t>Uneven quality of education</a:t>
-            </a:r>
-          </a:p>
-        </p:txBody>
-      </p:sp>
-      <p:pic>
-        <p:nvPicPr>
-          <p:cNvPr id="5" name="Picture 4">
+              <a:rPr lang="en-US" dirty="0"/>
+              <a:t>Theory</a:t>
+            </a:r>
+          </a:p>
+        </p:txBody>
+      </p:sp>
+      <p:sp>
+        <p:nvSpPr>
+          <p:cNvPr id="3" name="Text Placeholder 2">
             <a:extLst>
               <a:ext uri="{FF2B5EF4-FFF2-40B4-BE49-F238E27FC236}">
-                <a16:creationId xmlns:a16="http://schemas.microsoft.com/office/drawing/2014/main" id="{A125E0D4-CFA3-5842-A2EA-9D4920649CBF}"/>
+                <a16:creationId xmlns:a16="http://schemas.microsoft.com/office/drawing/2014/main" id="{A0B77D64-9B20-5E4E-8D19-3C58C718D9C4}"/>
               </a:ext>
             </a:extLst>
           </p:cNvPr>
-          <p:cNvPicPr>
-            <a:picLocks noChangeAspect="1"/>
-          </p:cNvPicPr>
-          <p:nvPr/>
-        </p:nvPicPr>
-        <p:blipFill>
-          <a:blip r:embed="rId2"/>
-          <a:stretch>
-            <a:fillRect/>
-          </a:stretch>
-        </p:blipFill>
+          <p:cNvSpPr>
+            <a:spLocks noGrp="1"/>
+          </p:cNvSpPr>
+          <p:nvPr>
+            <p:ph type="body" idx="1"/>
+          </p:nvPr>
+        </p:nvSpPr>
         <p:spPr>
           <a:xfrm>
-            <a:off x="4227642" y="355217"/>
-            <a:ext cx="4572000" cy="4572000"/>
+            <a:off x="311700" y="1573187"/>
+            <a:ext cx="8520600" cy="1997125"/>
           </a:xfrm>
-          <a:prstGeom prst="rect">
-            <a:avLst/>
-          </a:prstGeom>
         </p:spPr>
-      </p:pic>
+        <p:txBody>
+          <a:bodyPr/>
+          <a:lstStyle/>
+          <a:p>
+            <a:r>
+              <a:rPr lang="en-US" dirty="0"/>
+              <a:t>Executive-legislative bargain.</a:t>
+            </a:r>
+          </a:p>
+          <a:p>
+            <a:pPr lvl="1">
+              <a:spcBef>
+                <a:spcPts val="0"/>
+              </a:spcBef>
+            </a:pPr>
+            <a:r>
+              <a:rPr lang="en-US" dirty="0"/>
+              <a:t>Allocation (</a:t>
+            </a:r>
+            <a:r>
+              <a:rPr lang="en-US" i="1" dirty="0" err="1"/>
+              <a:t>alotação</a:t>
+            </a:r>
+            <a:r>
+              <a:rPr lang="en-US" dirty="0"/>
+              <a:t>) of jobs for legislative support.</a:t>
+            </a:r>
+            <a:endParaRPr lang="en-US" i="1" dirty="0"/>
+          </a:p>
+          <a:p>
+            <a:r>
+              <a:rPr lang="en-US" dirty="0"/>
+              <a:t>A mayor and opposition</a:t>
+            </a:r>
+            <a:r>
+              <a:rPr lang="en-US" i="1" dirty="0"/>
+              <a:t> </a:t>
+            </a:r>
+            <a:r>
+              <a:rPr lang="en-US" dirty="0"/>
+              <a:t>bargain over votes.</a:t>
+            </a:r>
+          </a:p>
+          <a:p>
+            <a:pPr lvl="1">
+              <a:spcBef>
+                <a:spcPts val="0"/>
+              </a:spcBef>
+            </a:pPr>
+            <a:r>
+              <a:rPr lang="en-US" dirty="0"/>
+              <a:t>Mayor enacts policy, exchanges patronage. </a:t>
+            </a:r>
+          </a:p>
+          <a:p>
+            <a:r>
+              <a:rPr lang="en-US" dirty="0"/>
+              <a:t>Empirical implications.</a:t>
+            </a:r>
+          </a:p>
+          <a:p>
+            <a:pPr lvl="1">
+              <a:spcBef>
+                <a:spcPts val="0"/>
+              </a:spcBef>
+            </a:pPr>
+            <a:r>
+              <a:rPr lang="en-US" dirty="0"/>
+              <a:t>Legislative opposition increases allocation.</a:t>
+            </a:r>
+          </a:p>
+          <a:p>
+            <a:pPr lvl="1">
+              <a:spcBef>
+                <a:spcPts val="0"/>
+              </a:spcBef>
+            </a:pPr>
+            <a:endParaRPr lang="en-US" dirty="0"/>
+          </a:p>
+          <a:p>
+            <a:endParaRPr lang="en-US" dirty="0"/>
+          </a:p>
+        </p:txBody>
+      </p:sp>
     </p:spTree>
     <p:extLst>
       <p:ext uri="{BB962C8B-B14F-4D97-AF65-F5344CB8AC3E}">
-        <p14:creationId xmlns:p14="http://schemas.microsoft.com/office/powerpoint/2010/main" val="4229263783"/>
+        <p14:creationId xmlns:p14="http://schemas.microsoft.com/office/powerpoint/2010/main" val="3489682144"/>
       </p:ext>
     </p:extLst>
   </p:cSld>
@@ -5824,7 +5914,7 @@
           <p:cNvPr id="2" name="Title 1">
             <a:extLst>
               <a:ext uri="{FF2B5EF4-FFF2-40B4-BE49-F238E27FC236}">
-                <a16:creationId xmlns:a16="http://schemas.microsoft.com/office/drawing/2014/main" id="{1EA46D49-AC36-5146-872C-916A16E7B676}"/>
+                <a16:creationId xmlns:a16="http://schemas.microsoft.com/office/drawing/2014/main" id="{D35F1646-CC29-8F4B-888A-172F06154A97}"/>
               </a:ext>
             </a:extLst>
           </p:cNvPr>
@@ -5842,7 +5932,7 @@
           <a:p>
             <a:r>
               <a:rPr lang="en-US" dirty="0"/>
-              <a:t>Theory</a:t>
+              <a:t>Empirical results</a:t>
             </a:r>
           </a:p>
         </p:txBody>
@@ -5852,7 +5942,7 @@
           <p:cNvPr id="3" name="Text Placeholder 2">
             <a:extLst>
               <a:ext uri="{FF2B5EF4-FFF2-40B4-BE49-F238E27FC236}">
-                <a16:creationId xmlns:a16="http://schemas.microsoft.com/office/drawing/2014/main" id="{A0B77D64-9B20-5E4E-8D19-3C58C718D9C4}"/>
+                <a16:creationId xmlns:a16="http://schemas.microsoft.com/office/drawing/2014/main" id="{F32820D8-AFB2-874A-B902-43F6DE329315}"/>
               </a:ext>
             </a:extLst>
           </p:cNvPr>
@@ -5870,7 +5960,7 @@
           <a:p>
             <a:r>
               <a:rPr lang="en-US" dirty="0"/>
-              <a:t>Executive-legislative bargain.</a:t>
+              <a:t>Legislative opposition increases bureaucratic turnover.</a:t>
             </a:r>
           </a:p>
           <a:p>
@@ -5881,30 +5971,58 @@
             </a:pPr>
             <a:r>
               <a:rPr lang="en-US" dirty="0"/>
-              <a:t>Allocation (</a:t>
+              <a:t>Individual and municipal-level estimations.</a:t>
+            </a:r>
+          </a:p>
+          <a:p>
+            <a:r>
+              <a:rPr lang="en-US" dirty="0"/>
+              <a:t>Bureaucratic turnover lowers student learning.</a:t>
+            </a:r>
+          </a:p>
+          <a:p>
+            <a:pPr lvl="1">
+              <a:spcBef>
+                <a:spcPts val="0"/>
+              </a:spcBef>
+            </a:pPr>
+            <a:r>
+              <a:rPr lang="en-US" dirty="0"/>
+              <a:t>Standardized exams: </a:t>
             </a:r>
             <a:r>
               <a:rPr lang="en-US" i="1" dirty="0" err="1"/>
-              <a:t>alotação</a:t>
-            </a:r>
-            <a:r>
-              <a:rPr lang="en-US" dirty="0"/>
-              <a:t>) of positions for legislative support.</a:t>
-            </a:r>
-            <a:endParaRPr lang="en-US" i="1" dirty="0"/>
-          </a:p>
-          <a:p>
-            <a:r>
-              <a:rPr lang="en-US" dirty="0"/>
-              <a:t>A mayor and opposition</a:t>
+              <a:t>Prova</a:t>
             </a:r>
             <a:r>
               <a:rPr lang="en-US" i="1" dirty="0"/>
               <a:t> </a:t>
             </a:r>
             <a:r>
+              <a:rPr lang="en-US" i="1" dirty="0" err="1"/>
+              <a:t>Brasil</a:t>
+            </a:r>
+            <a:r>
+              <a:rPr lang="en-US" i="1" dirty="0"/>
+              <a:t> </a:t>
+            </a:r>
+            <a:r>
               <a:rPr lang="en-US" dirty="0"/>
-              <a:t>bargain over legislative votes.</a:t>
+              <a:t>and </a:t>
+            </a:r>
+            <a:r>
+              <a:rPr lang="en-US" i="1" dirty="0" err="1"/>
+              <a:t>Spaece</a:t>
+            </a:r>
+            <a:r>
+              <a:rPr lang="en-US" dirty="0"/>
+              <a:t>.</a:t>
+            </a:r>
+          </a:p>
+          <a:p>
+            <a:r>
+              <a:rPr lang="en-US" dirty="0"/>
+              <a:t>Electoral accountability does not bite.</a:t>
             </a:r>
           </a:p>
           <a:p>
@@ -5915,72 +6033,15 @@
             </a:pPr>
             <a:r>
               <a:rPr lang="en-US" dirty="0"/>
-              <a:t>Mayor wants to enact policy, buys votes through patronage.</a:t>
-            </a:r>
-          </a:p>
-          <a:p>
-            <a:pPr lvl="1">
-              <a:spcBef>
-                <a:spcPts val="0"/>
-              </a:spcBef>
-            </a:pPr>
-            <a:r>
-              <a:rPr lang="en-US" dirty="0">
-                <a:solidFill>
-                  <a:schemeClr val="tx1">
-                    <a:lumMod val="50000"/>
-                    <a:lumOff val="50000"/>
-                  </a:schemeClr>
-                </a:solidFill>
-              </a:rPr>
-              <a:t>Banks 2000, Groseclose and Snyder 1996</a:t>
-            </a:r>
-          </a:p>
-          <a:p>
-            <a:r>
-              <a:rPr lang="en-US" dirty="0"/>
-              <a:t>Empirical implications.</a:t>
-            </a:r>
-          </a:p>
-          <a:p>
-            <a:pPr lvl="1">
-              <a:spcBef>
-                <a:spcPts val="0"/>
-              </a:spcBef>
-            </a:pPr>
-            <a:r>
-              <a:rPr lang="en-US" dirty="0"/>
-              <a:t>Legislative opposition increases patronage.</a:t>
-            </a:r>
-          </a:p>
-          <a:p>
-            <a:pPr lvl="1">
-              <a:spcBef>
-                <a:spcPts val="0"/>
-              </a:spcBef>
-            </a:pPr>
-            <a:r>
-              <a:rPr lang="en-US" dirty="0"/>
-              <a:t>Irrespective of the electoral term.</a:t>
-            </a:r>
-          </a:p>
-          <a:p>
-            <a:pPr lvl="1">
-              <a:spcBef>
-                <a:spcPts val="0"/>
-              </a:spcBef>
-            </a:pPr>
-            <a:endParaRPr lang="en-US" dirty="0"/>
-          </a:p>
-          <a:p>
-            <a:endParaRPr lang="en-US" dirty="0"/>
+              <a:t>Quality of education does not </a:t>
+            </a:r>
           </a:p>
         </p:txBody>
       </p:sp>
     </p:spTree>
     <p:extLst>
       <p:ext uri="{BB962C8B-B14F-4D97-AF65-F5344CB8AC3E}">
-        <p14:creationId xmlns:p14="http://schemas.microsoft.com/office/powerpoint/2010/main" val="3489682144"/>
+        <p14:creationId xmlns:p14="http://schemas.microsoft.com/office/powerpoint/2010/main" val="3105911460"/>
       </p:ext>
     </p:extLst>
   </p:cSld>
@@ -5991,6 +6052,74 @@
 </file>
 
 <file path=ppt/slides/slide13.xml><?xml version="1.0" encoding="utf-8"?>
+<p:sld xmlns:a="http://schemas.openxmlformats.org/drawingml/2006/main" xmlns:r="http://schemas.openxmlformats.org/officeDocument/2006/relationships" xmlns:p="http://schemas.openxmlformats.org/presentationml/2006/main">
+  <p:cSld>
+    <p:bg>
+      <p:bgPr>
+        <a:solidFill>
+          <a:schemeClr val="bg1"/>
+        </a:solidFill>
+        <a:effectLst/>
+      </p:bgPr>
+    </p:bg>
+    <p:spTree>
+      <p:nvGrpSpPr>
+        <p:cNvPr id="1" name=""/>
+        <p:cNvGrpSpPr/>
+        <p:nvPr/>
+      </p:nvGrpSpPr>
+      <p:grpSpPr>
+        <a:xfrm>
+          <a:off x="0" y="0"/>
+          <a:ext cx="0" cy="0"/>
+          <a:chOff x="0" y="0"/>
+          <a:chExt cx="0" cy="0"/>
+        </a:xfrm>
+      </p:grpSpPr>
+      <p:pic>
+        <p:nvPicPr>
+          <p:cNvPr id="5" name="Picture 4">
+            <a:extLst>
+              <a:ext uri="{FF2B5EF4-FFF2-40B4-BE49-F238E27FC236}">
+                <a16:creationId xmlns:a16="http://schemas.microsoft.com/office/drawing/2014/main" id="{C3052410-E4C0-6443-8DA3-3FAC90FF71FE}"/>
+              </a:ext>
+            </a:extLst>
+          </p:cNvPr>
+          <p:cNvPicPr>
+            <a:picLocks noChangeAspect="1"/>
+          </p:cNvPicPr>
+          <p:nvPr/>
+        </p:nvPicPr>
+        <p:blipFill>
+          <a:blip r:embed="rId2"/>
+          <a:stretch>
+            <a:fillRect/>
+          </a:stretch>
+        </p:blipFill>
+        <p:spPr>
+          <a:xfrm>
+            <a:off x="1090083" y="482599"/>
+            <a:ext cx="6963833" cy="4178300"/>
+          </a:xfrm>
+          <a:prstGeom prst="rect">
+            <a:avLst/>
+          </a:prstGeom>
+        </p:spPr>
+      </p:pic>
+    </p:spTree>
+    <p:extLst>
+      <p:ext uri="{BB962C8B-B14F-4D97-AF65-F5344CB8AC3E}">
+        <p14:creationId xmlns:p14="http://schemas.microsoft.com/office/powerpoint/2010/main" val="2308885326"/>
+      </p:ext>
+    </p:extLst>
+  </p:cSld>
+  <p:clrMapOvr>
+    <a:masterClrMapping/>
+  </p:clrMapOvr>
+</p:sld>
+</file>
+
+<file path=ppt/slides/slide14.xml><?xml version="1.0" encoding="utf-8"?>
 <p:sld xmlns:a="http://schemas.openxmlformats.org/drawingml/2006/main" xmlns:r="http://schemas.openxmlformats.org/officeDocument/2006/relationships" xmlns:p="http://schemas.openxmlformats.org/presentationml/2006/main">
   <p:cSld>
     <p:spTree>
@@ -6007,69 +6136,10 @@
           <a:chExt cx="0" cy="0"/>
         </a:xfrm>
       </p:grpSpPr>
-      <p:sp>
-        <p:nvSpPr>
-          <p:cNvPr id="2" name="Title 1">
-            <a:extLst>
-              <a:ext uri="{FF2B5EF4-FFF2-40B4-BE49-F238E27FC236}">
-                <a16:creationId xmlns:a16="http://schemas.microsoft.com/office/drawing/2014/main" id="{D35F1646-CC29-8F4B-888A-172F06154A97}"/>
-              </a:ext>
-            </a:extLst>
-          </p:cNvPr>
-          <p:cNvSpPr>
-            <a:spLocks noGrp="1"/>
-          </p:cNvSpPr>
-          <p:nvPr>
-            <p:ph type="title"/>
-          </p:nvPr>
-        </p:nvSpPr>
-        <p:spPr/>
-        <p:txBody>
-          <a:bodyPr/>
-          <a:lstStyle/>
-          <a:p>
-            <a:r>
-              <a:rPr lang="en-US" dirty="0"/>
-              <a:t>Empirical results</a:t>
-            </a:r>
-          </a:p>
-        </p:txBody>
-      </p:sp>
-      <p:sp>
-        <p:nvSpPr>
-          <p:cNvPr id="3" name="Text Placeholder 2">
-            <a:extLst>
-              <a:ext uri="{FF2B5EF4-FFF2-40B4-BE49-F238E27FC236}">
-                <a16:creationId xmlns:a16="http://schemas.microsoft.com/office/drawing/2014/main" id="{F32820D8-AFB2-874A-B902-43F6DE329315}"/>
-              </a:ext>
-            </a:extLst>
-          </p:cNvPr>
-          <p:cNvSpPr>
-            <a:spLocks noGrp="1"/>
-          </p:cNvSpPr>
-          <p:nvPr>
-            <p:ph type="body" idx="1"/>
-          </p:nvPr>
-        </p:nvSpPr>
-        <p:spPr/>
-        <p:txBody>
-          <a:bodyPr/>
-          <a:lstStyle/>
-          <a:p>
-            <a:r>
-              <a:rPr lang="en-US" dirty="0"/>
-              <a:t>First step: legislative opposition and bureaucratic turnover.</a:t>
-            </a:r>
-          </a:p>
-          <a:p>
-            <a:endParaRPr lang="en-US" dirty="0"/>
-          </a:p>
-        </p:txBody>
-      </p:sp>
     </p:spTree>
     <p:extLst>
       <p:ext uri="{BB962C8B-B14F-4D97-AF65-F5344CB8AC3E}">
-        <p14:creationId xmlns:p14="http://schemas.microsoft.com/office/powerpoint/2010/main" val="3105911460"/>
+        <p14:creationId xmlns:p14="http://schemas.microsoft.com/office/powerpoint/2010/main" val="2137847187"/>
       </p:ext>
     </p:extLst>
   </p:cSld>
@@ -6131,10 +6201,18 @@
               <a:buNone/>
             </a:pPr>
             <a:r>
-              <a:rPr lang="en" sz="1300" b="1" i="1" dirty="0"/>
+              <a:rPr lang="en" sz="1300" b="1" i="1" dirty="0">
+                <a:solidFill>
+                  <a:schemeClr val="accent2"/>
+                </a:solidFill>
+              </a:rPr>
               <a:t>Three out of every ten Brazilians are unable to read or write.</a:t>
             </a:r>
-            <a:endParaRPr sz="1300" b="1" i="1" dirty="0"/>
+            <a:endParaRPr sz="1300" b="1" i="1" dirty="0">
+              <a:solidFill>
+                <a:schemeClr val="accent2"/>
+              </a:solidFill>
+            </a:endParaRPr>
           </a:p>
         </p:txBody>
       </p:sp>
@@ -6173,10 +6251,26 @@
               <a:buNone/>
             </a:pPr>
             <a:r>
-              <a:rPr lang="en" sz="1300" b="1" i="1"/>
-              <a:t>Ceará, one of the poorest states in Brazil, has the best performing public schools</a:t>
-            </a:r>
-            <a:endParaRPr sz="1300" b="1" i="1"/>
+              <a:rPr lang="en" sz="1300" b="1" i="1" dirty="0" err="1">
+                <a:solidFill>
+                  <a:schemeClr val="accent2"/>
+                </a:solidFill>
+              </a:rPr>
+              <a:t>Ceará</a:t>
+            </a:r>
+            <a:r>
+              <a:rPr lang="en" sz="1300" b="1" i="1" dirty="0">
+                <a:solidFill>
+                  <a:schemeClr val="accent2"/>
+                </a:solidFill>
+              </a:rPr>
+              <a:t>, one of the poorest states in Brazil, has the best performing public schools</a:t>
+            </a:r>
+            <a:endParaRPr sz="1300" b="1" i="1" dirty="0">
+              <a:solidFill>
+                <a:schemeClr val="accent2"/>
+              </a:solidFill>
+            </a:endParaRPr>
           </a:p>
         </p:txBody>
       </p:sp>
@@ -6271,7 +6365,7 @@
         </p:nvSpPr>
         <p:spPr>
           <a:xfrm>
-            <a:off x="311700" y="2285400"/>
+            <a:off x="311700" y="2097022"/>
             <a:ext cx="8520600" cy="572700"/>
           </a:xfrm>
           <a:prstGeom prst="rect">
@@ -6294,10 +6388,10 @@
               <a:buNone/>
             </a:pPr>
             <a:r>
-              <a:rPr lang="en" b="1" i="1"/>
+              <a:rPr lang="en" sz="2800" b="1" i="1" dirty="0"/>
               <a:t>How can governments improve the quality of public education?</a:t>
             </a:r>
-            <a:endParaRPr b="1" i="1"/>
+            <a:endParaRPr sz="2800" b="1" i="1" dirty="0"/>
           </a:p>
         </p:txBody>
       </p:sp>
@@ -6375,6 +6469,10 @@
           </p:nvPr>
         </p:nvSpPr>
         <p:spPr>
+          <a:xfrm>
+            <a:off x="311700" y="1735566"/>
+            <a:ext cx="8520600" cy="1672368"/>
+          </a:xfrm>
           <a:prstGeom prst="rect">
             <a:avLst/>
           </a:prstGeom>
@@ -6397,9 +6495,27 @@
             </a:pPr>
             <a:r>
               <a:rPr lang="en" dirty="0"/>
-              <a:t>Previous studies find that bureaucratic incentives work.</a:t>
-            </a:r>
-            <a:endParaRPr dirty="0"/>
+              <a:t>Previous studies find that </a:t>
+            </a:r>
+            <a:r>
+              <a:rPr lang="en" dirty="0">
+                <a:solidFill>
+                  <a:schemeClr val="tx1">
+                    <a:lumMod val="85000"/>
+                    <a:lumOff val="15000"/>
+                  </a:schemeClr>
+                </a:solidFill>
+              </a:rPr>
+              <a:t>bureaucratic incentives work.</a:t>
+            </a:r>
+            <a:endParaRPr dirty="0">
+              <a:solidFill>
+                <a:schemeClr val="tx1">
+                  <a:lumMod val="85000"/>
+                  <a:lumOff val="15000"/>
+                </a:schemeClr>
+              </a:solidFill>
+            </a:endParaRPr>
           </a:p>
           <a:p>
             <a:pPr marL="914400" lvl="1" indent="-317500" algn="l" rtl="0">
@@ -6488,11 +6604,17 @@
             </a:pPr>
             <a:r>
               <a:rPr lang="en" sz="1800" dirty="0">
+                <a:solidFill>
+                  <a:schemeClr val="accent2"/>
+                </a:solidFill>
                 <a:latin typeface="Metropolis" pitchFamily="2" charset="77"/>
               </a:rPr>
               <a:t>Political incentives shape bureaucracies.</a:t>
             </a:r>
             <a:endParaRPr sz="1800" dirty="0">
+              <a:solidFill>
+                <a:schemeClr val="accent2"/>
+              </a:solidFill>
               <a:latin typeface="Metropolis" pitchFamily="2" charset="77"/>
             </a:endParaRPr>
           </a:p>
@@ -6528,7 +6650,25 @@
               <a:rPr lang="en" sz="1800" dirty="0">
                 <a:latin typeface="Metropolis" pitchFamily="2" charset="77"/>
               </a:rPr>
-              <a:t>Understand how patronage operates at a local level.</a:t>
+              <a:t>Understand how </a:t>
+            </a:r>
+            <a:r>
+              <a:rPr lang="en" sz="1800" dirty="0">
+                <a:solidFill>
+                  <a:schemeClr val="tx1">
+                    <a:lumMod val="85000"/>
+                    <a:lumOff val="15000"/>
+                  </a:schemeClr>
+                </a:solidFill>
+                <a:latin typeface="Metropolis" pitchFamily="2" charset="77"/>
+              </a:rPr>
+              <a:t>patronage</a:t>
+            </a:r>
+            <a:r>
+              <a:rPr lang="en" sz="1800" dirty="0">
+                <a:latin typeface="Metropolis" pitchFamily="2" charset="77"/>
+              </a:rPr>
+              <a:t> operates at a local level.</a:t>
             </a:r>
             <a:endParaRPr sz="1800" dirty="0">
               <a:latin typeface="Metropolis" pitchFamily="2" charset="77"/>
@@ -6563,40 +6703,6 @@
       </p:grpSpPr>
       <p:sp>
         <p:nvSpPr>
-          <p:cNvPr id="85" name="Google Shape;85;p17"/>
-          <p:cNvSpPr txBox="1">
-            <a:spLocks noGrp="1"/>
-          </p:cNvSpPr>
-          <p:nvPr>
-            <p:ph type="title"/>
-          </p:nvPr>
-        </p:nvSpPr>
-        <p:spPr>
-          <a:prstGeom prst="rect">
-            <a:avLst/>
-          </a:prstGeom>
-        </p:spPr>
-        <p:txBody>
-          <a:bodyPr spcFirstLastPara="1" wrap="square" lIns="91425" tIns="91425" rIns="91425" bIns="91425" anchor="t" anchorCtr="0">
-            <a:noAutofit/>
-          </a:bodyPr>
-          <a:lstStyle/>
-          <a:p>
-            <a:pPr marL="0" lvl="0" indent="0" algn="l" rtl="0">
-              <a:spcBef>
-                <a:spcPts val="0"/>
-              </a:spcBef>
-              <a:spcAft>
-                <a:spcPts val="0"/>
-              </a:spcAft>
-              <a:buNone/>
-            </a:pPr>
-            <a:endParaRPr/>
-          </a:p>
-        </p:txBody>
-      </p:sp>
-      <p:sp>
-        <p:nvSpPr>
           <p:cNvPr id="84" name="Google Shape;84;p17"/>
           <p:cNvSpPr txBox="1">
             <a:spLocks noGrp="1"/>
@@ -6710,10 +6816,10 @@
               <a:buNone/>
             </a:pPr>
             <a:r>
-              <a:rPr lang="en"/>
+              <a:rPr lang="en" dirty="0"/>
               <a:t>Findings</a:t>
             </a:r>
-            <a:endParaRPr/>
+            <a:endParaRPr dirty="0"/>
           </a:p>
         </p:txBody>
       </p:sp>
@@ -6728,6 +6834,10 @@
           </p:nvPr>
         </p:nvSpPr>
         <p:spPr>
+          <a:xfrm>
+            <a:off x="311700" y="1573187"/>
+            <a:ext cx="8520600" cy="1997125"/>
+          </a:xfrm>
           <a:prstGeom prst="rect">
             <a:avLst/>
           </a:prstGeom>
@@ -6769,7 +6879,7 @@
               <a:rPr lang="en" sz="1800" dirty="0">
                 <a:latin typeface="Metropolis" pitchFamily="2" charset="77"/>
               </a:rPr>
-              <a:t>Mayors exchange patronage for support by city councilors.</a:t>
+              <a:t>Mayors exchange patronage for support.</a:t>
             </a:r>
             <a:endParaRPr sz="1800" dirty="0">
               <a:latin typeface="Metropolis" pitchFamily="2" charset="77"/>
@@ -6788,7 +6898,7 @@
             </a:pPr>
             <a:r>
               <a:rPr lang="en" dirty="0"/>
-              <a:t>Propose a theory to model legislative vote-buying.</a:t>
+              <a:t>Propose a theory of legislative vote-buying.</a:t>
             </a:r>
             <a:endParaRPr dirty="0"/>
           </a:p>
@@ -6826,7 +6936,7 @@
             </a:pPr>
             <a:r>
               <a:rPr lang="en" dirty="0"/>
-              <a:t>Validate theoretical model with large-scale educational data.</a:t>
+              <a:t>Validation with large-scale educational data.</a:t>
             </a:r>
             <a:endParaRPr dirty="0"/>
           </a:p>
@@ -6927,6 +7037,10 @@
           </p:nvPr>
         </p:nvSpPr>
         <p:spPr>
+          <a:xfrm>
+            <a:off x="311700" y="1573187"/>
+            <a:ext cx="8520600" cy="1997125"/>
+          </a:xfrm>
           <a:prstGeom prst="rect">
             <a:avLst/>
           </a:prstGeom>
@@ -7190,7 +7304,7 @@
               <a:rPr lang="en" sz="1800" dirty="0">
                 <a:latin typeface="Metropolis" pitchFamily="2" charset="77"/>
               </a:rPr>
-              <a:t>Political elites hijack electoral accountability.</a:t>
+              <a:t>Political capture without electoral accountability.</a:t>
             </a:r>
             <a:endParaRPr sz="1800" dirty="0">
               <a:latin typeface="Metropolis" pitchFamily="2" charset="77"/>
@@ -7272,6 +7386,10 @@
           </p:nvPr>
         </p:nvSpPr>
         <p:spPr>
+          <a:xfrm>
+            <a:off x="311700" y="1996168"/>
+            <a:ext cx="8520600" cy="1151164"/>
+          </a:xfrm>
           <a:prstGeom prst="rect">
             <a:avLst/>
           </a:prstGeom>
@@ -7430,8 +7548,8 @@
         </p:nvSpPr>
         <p:spPr>
           <a:xfrm>
-            <a:off x="3922375" y="638270"/>
-            <a:ext cx="4798800" cy="4082586"/>
+            <a:off x="3922375" y="942025"/>
+            <a:ext cx="4798800" cy="3259449"/>
           </a:xfrm>
           <a:prstGeom prst="rect">
             <a:avLst/>
@@ -7443,77 +7561,6 @@
           </a:bodyPr>
           <a:lstStyle/>
           <a:p>
-            <a:pPr marL="457200" lvl="0" indent="-342900" algn="l" rtl="0">
-              <a:lnSpc>
-                <a:spcPct val="100000"/>
-              </a:lnSpc>
-              <a:spcAft>
-                <a:spcPts val="0"/>
-              </a:spcAft>
-              <a:buSzPts val="1800"/>
-              <a:buChar char="●"/>
-            </a:pPr>
-            <a:r>
-              <a:rPr lang="en" dirty="0"/>
-              <a:t>Municipalities responsible for basic education.</a:t>
-            </a:r>
-            <a:endParaRPr dirty="0"/>
-          </a:p>
-          <a:p>
-            <a:pPr marL="914400" lvl="1" indent="-317500" algn="l" rtl="0">
-              <a:lnSpc>
-                <a:spcPct val="100000"/>
-              </a:lnSpc>
-              <a:spcBef>
-                <a:spcPts val="0"/>
-              </a:spcBef>
-              <a:spcAft>
-                <a:spcPts val="0"/>
-              </a:spcAft>
-              <a:buSzPts val="1400"/>
-              <a:buChar char="○"/>
-            </a:pPr>
-            <a:r>
-              <a:rPr lang="en-US" sz="1800" dirty="0">
-                <a:latin typeface="Metropolis" pitchFamily="2" charset="77"/>
-              </a:rPr>
-              <a:t>Governed by mayor and city council.</a:t>
-            </a:r>
-            <a:endParaRPr sz="1800" dirty="0">
-              <a:latin typeface="Metropolis" pitchFamily="2" charset="77"/>
-            </a:endParaRPr>
-          </a:p>
-          <a:p>
-            <a:pPr marL="457200" lvl="0" indent="-342900" algn="l" rtl="0">
-              <a:lnSpc>
-                <a:spcPct val="100000"/>
-              </a:lnSpc>
-              <a:spcAft>
-                <a:spcPts val="0"/>
-              </a:spcAft>
-              <a:buSzPts val="1800"/>
-              <a:buChar char="●"/>
-            </a:pPr>
-            <a:r>
-              <a:rPr lang="en" dirty="0"/>
-              <a:t>Personnel decisions under mayoral jurisdiction.</a:t>
-            </a:r>
-          </a:p>
-          <a:p>
-            <a:pPr lvl="1">
-              <a:lnSpc>
-                <a:spcPct val="100000"/>
-              </a:lnSpc>
-              <a:spcBef>
-                <a:spcPts val="0"/>
-              </a:spcBef>
-            </a:pPr>
-            <a:r>
-              <a:rPr lang="en" dirty="0"/>
-              <a:t>Teachers and principals (RAIS and School Census)</a:t>
-            </a:r>
-          </a:p>
-          <a:p>
             <a:pPr>
               <a:lnSpc>
                 <a:spcPct val="100000"/>
@@ -7521,8 +7568,9 @@
             </a:pPr>
             <a:r>
               <a:rPr lang="en" dirty="0"/>
-              <a:t>Student learning evaluated by federal government.</a:t>
-            </a:r>
+              <a:t>Municipalities responsible for basic education.</a:t>
+            </a:r>
+            <a:endParaRPr dirty="0"/>
           </a:p>
           <a:p>
             <a:pPr lvl="1">
@@ -7534,32 +7582,87 @@
               </a:spcBef>
             </a:pPr>
             <a:r>
-              <a:rPr lang="en" dirty="0" err="1"/>
-              <a:t>Prova</a:t>
-            </a:r>
-            <a:r>
-              <a:rPr lang="en" dirty="0"/>
-              <a:t> </a:t>
-            </a:r>
-            <a:r>
-              <a:rPr lang="en" dirty="0" err="1"/>
-              <a:t>Brasil</a:t>
-            </a:r>
-            <a:r>
-              <a:rPr lang="en" dirty="0"/>
-              <a:t> (SAEB)</a:t>
-            </a:r>
-          </a:p>
-          <a:p>
-            <a:pPr marL="457200" lvl="0" indent="-342900" algn="l" rtl="0">
+              <a:rPr lang="en-US" sz="1800" dirty="0">
+                <a:latin typeface="Metropolis" pitchFamily="2" charset="77"/>
+              </a:rPr>
+              <a:t>Governed by mayor and city council.</a:t>
+            </a:r>
+            <a:endParaRPr sz="1800" dirty="0">
+              <a:latin typeface="Metropolis" pitchFamily="2" charset="77"/>
+            </a:endParaRPr>
+          </a:p>
+          <a:p>
+            <a:pPr>
               <a:lnSpc>
                 <a:spcPct val="100000"/>
               </a:lnSpc>
-              <a:spcAft>
-                <a:spcPts val="0"/>
-              </a:spcAft>
-              <a:buSzPts val="1800"/>
-              <a:buChar char="●"/>
+            </a:pPr>
+            <a:r>
+              <a:rPr lang="en" dirty="0"/>
+              <a:t>Personnel decisions under mayoral jurisdiction.</a:t>
+            </a:r>
+          </a:p>
+          <a:p>
+            <a:pPr lvl="1">
+              <a:lnSpc>
+                <a:spcPct val="100000"/>
+              </a:lnSpc>
+              <a:spcBef>
+                <a:spcPts val="0"/>
+              </a:spcBef>
+            </a:pPr>
+            <a:r>
+              <a:rPr lang="en" dirty="0"/>
+              <a:t>Teachers and principals (RAIS and School Census)</a:t>
+            </a:r>
+          </a:p>
+          <a:p>
+            <a:pPr>
+              <a:lnSpc>
+                <a:spcPct val="100000"/>
+              </a:lnSpc>
+            </a:pPr>
+            <a:r>
+              <a:rPr lang="en" dirty="0"/>
+              <a:t>Student learning evaluation.</a:t>
+            </a:r>
+          </a:p>
+          <a:p>
+            <a:pPr lvl="1">
+              <a:lnSpc>
+                <a:spcPct val="100000"/>
+              </a:lnSpc>
+              <a:spcBef>
+                <a:spcPts val="0"/>
+              </a:spcBef>
+            </a:pPr>
+            <a:r>
+              <a:rPr lang="en" dirty="0" err="1"/>
+              <a:t>Prova</a:t>
+            </a:r>
+            <a:r>
+              <a:rPr lang="en" dirty="0"/>
+              <a:t> </a:t>
+            </a:r>
+            <a:r>
+              <a:rPr lang="en" dirty="0" err="1"/>
+              <a:t>Brasil</a:t>
+            </a:r>
+            <a:r>
+              <a:rPr lang="en" dirty="0"/>
+              <a:t> and </a:t>
+            </a:r>
+            <a:r>
+              <a:rPr lang="en" dirty="0" err="1"/>
+              <a:t>Spaece</a:t>
+            </a:r>
+            <a:endParaRPr lang="en" dirty="0"/>
+          </a:p>
+          <a:p>
+            <a:pPr>
+              <a:lnSpc>
+                <a:spcPct val="100000"/>
+              </a:lnSpc>
             </a:pPr>
             <a:endParaRPr lang="en" dirty="0"/>
           </a:p>

</xml_diff>